<commit_message>
add knowledge about finance
</commit_message>
<xml_diff>
--- a/LearningNote/CEH/CEH.pptx
+++ b/LearningNote/CEH/CEH.pptx
@@ -5,7 +5,7 @@
     <p:sldMasterId id="2147483648" r:id="rId1"/>
   </p:sldMasterIdLst>
   <p:notesMasterIdLst>
-    <p:notesMasterId r:id="rId14"/>
+    <p:notesMasterId r:id="rId15"/>
   </p:notesMasterIdLst>
   <p:sldIdLst>
     <p:sldId id="256" r:id="rId2"/>
@@ -20,6 +20,7 @@
     <p:sldId id="265" r:id="rId11"/>
     <p:sldId id="266" r:id="rId12"/>
     <p:sldId id="267" r:id="rId13"/>
+    <p:sldId id="268" r:id="rId14"/>
   </p:sldIdLst>
   <p:sldSz cx="13004800" cy="9753600"/>
   <p:notesSz cx="6858000" cy="9144000"/>
@@ -321,7 +322,27 @@
       </a:defRPr>
     </a:lvl9pPr>
   </p:defaultTextStyle>
+  <p:extLst>
+    <p:ext uri="{EFAFB233-063F-42B5-8137-9DF3F51BA10A}">
+      <p15:sldGuideLst xmlns:p15="http://schemas.microsoft.com/office/powerpoint/2012/main">
+        <p15:guide id="1" orient="horz" pos="3072">
+          <p15:clr>
+            <a:srgbClr val="A4A3A4"/>
+          </p15:clr>
+        </p15:guide>
+        <p15:guide id="2" pos="4096">
+          <p15:clr>
+            <a:srgbClr val="A4A3A4"/>
+          </p15:clr>
+        </p15:guide>
+      </p15:sldGuideLst>
+    </p:ext>
+  </p:extLst>
 </p:presentation>
+</file>
+
+<file path=ppt/revisionInfo.xml><?xml version="1.0" encoding="utf-8"?>
+<p1510:revInfo xmlns:a="http://schemas.openxmlformats.org/drawingml/2006/main" xmlns:r="http://schemas.openxmlformats.org/officeDocument/2006/relationships" xmlns:p1510="http://schemas.microsoft.com/office/powerpoint/2015/10/main"/>
 </file>
 
 <file path=ppt/notesMasters/notesMaster1.xml><?xml version="1.0" encoding="utf-8"?>
@@ -2129,7 +2150,7 @@
           </a:ln>
           <a:extLst>
             <a:ext uri="{C572A759-6A51-4108-AA02-DFA0A04FC94B}">
-              <ma14:wrappingTextBoxFlag xmlns="" xmlns:ma14="http://schemas.microsoft.com/office/mac/drawingml/2011/main" val="1"/>
+              <ma14:wrappingTextBoxFlag xmlns:ma14="http://schemas.microsoft.com/office/mac/drawingml/2011/main" xmlns="" val="1"/>
             </a:ext>
           </a:extLst>
         </p:spPr>
@@ -2168,7 +2189,7 @@
           </a:ln>
           <a:extLst>
             <a:ext uri="{C572A759-6A51-4108-AA02-DFA0A04FC94B}">
-              <ma14:wrappingTextBoxFlag xmlns="" xmlns:ma14="http://schemas.microsoft.com/office/mac/drawingml/2011/main" val="1"/>
+              <ma14:wrappingTextBoxFlag xmlns:ma14="http://schemas.microsoft.com/office/mac/drawingml/2011/main" xmlns="" val="1"/>
             </a:ext>
           </a:extLst>
         </p:spPr>
@@ -3095,7 +3116,7 @@
           </a:ln>
           <a:extLst>
             <a:ext uri="{C572A759-6A51-4108-AA02-DFA0A04FC94B}">
-              <ma14:wrappingTextBoxFlag xmlns="" xmlns:ma14="http://schemas.microsoft.com/office/mac/drawingml/2011/main" val="1"/>
+              <ma14:wrappingTextBoxFlag xmlns:ma14="http://schemas.microsoft.com/office/mac/drawingml/2011/main" xmlns="" val="1"/>
             </a:ext>
           </a:extLst>
         </p:spPr>
@@ -3170,7 +3191,7 @@
               <a:t>L2TP: Layer 2 Tunneling Protocol is a tunneling protocol used to support virtual private networks (VPNs) or as part of the delivery of services by ISPs. It does </a:t>
             </a:r>
             <a:r>
-              <a:rPr lang="en-US" dirty="0" smtClean="0">
+              <a:rPr lang="en-US" dirty="0">
                 <a:solidFill>
                   <a:srgbClr val="FF0000"/>
                 </a:solidFill>
@@ -3178,16 +3199,12 @@
               <a:t>NOT</a:t>
             </a:r>
             <a:r>
-              <a:rPr lang="en-US" dirty="0" smtClean="0"/>
+              <a:rPr lang="en-US" dirty="0"/>
               <a:t> </a:t>
             </a:r>
             <a:r>
-              <a:rPr dirty="0" smtClean="0"/>
-              <a:t>provide </a:t>
-            </a:r>
-            <a:r>
               <a:rPr dirty="0"/>
-              <a:t>any encryption or confidentiality by itself.</a:t>
+              <a:t>provide any encryption or confidentiality by itself.</a:t>
             </a:r>
           </a:p>
           <a:p>
@@ -3220,30 +3237,26 @@
             </a:r>
             <a:r>
               <a:rPr dirty="0" err="1"/>
-              <a:t>托管</a:t>
-            </a:r>
-            <a:r>
-              <a:rPr dirty="0" err="1" smtClean="0"/>
-              <a:t>key</a:t>
-            </a:r>
-            <a:r>
-              <a:rPr lang="en-US" dirty="0" smtClean="0"/>
+              <a:t>托管key</a:t>
+            </a:r>
+            <a:r>
+              <a:rPr lang="en-US" dirty="0"/>
               <a:t>,</a:t>
             </a:r>
             <a:r>
-              <a:rPr lang="zh-CN" altLang="en-US" dirty="0" smtClean="0"/>
+              <a:rPr lang="zh-CN" altLang="en-US" dirty="0"/>
               <a:t>这个不知道是什么东西</a:t>
             </a:r>
             <a:r>
-              <a:rPr lang="en-US" altLang="zh-CN" dirty="0" smtClean="0"/>
+              <a:rPr lang="en-US" altLang="zh-CN" dirty="0"/>
               <a:t>	</a:t>
             </a:r>
             <a:r>
-              <a:rPr lang="en-US" dirty="0" smtClean="0"/>
+              <a:rPr lang="en-US" dirty="0"/>
               <a:t>(</a:t>
             </a:r>
             <a:r>
-              <a:rPr dirty="0" err="1" smtClean="0"/>
+              <a:rPr dirty="0" err="1"/>
               <a:t>在</a:t>
             </a:r>
             <a:r>
@@ -3275,30 +3288,26 @@
             </a:r>
             <a:r>
               <a:rPr dirty="0" err="1"/>
-              <a:t>中</a:t>
-            </a:r>
-            <a:r>
-              <a:rPr dirty="0" err="1" smtClean="0"/>
-              <a:t>，</a:t>
-            </a:r>
-            <a:r>
-              <a:rPr lang="en-US" u="sng" dirty="0" err="1" smtClean="0"/>
+              <a:t>中，</a:t>
+            </a:r>
+            <a:r>
+              <a:rPr lang="en-US" u="sng" dirty="0" err="1"/>
               <a:t>previous</a:t>
             </a:r>
             <a:r>
-              <a:rPr lang="en-US" u="sng" dirty="0" smtClean="0"/>
+              <a:rPr lang="en-US" u="sng" dirty="0"/>
               <a:t> </a:t>
             </a:r>
             <a:r>
-              <a:rPr lang="en-US" u="sng" dirty="0" err="1" smtClean="0"/>
+              <a:rPr lang="en-US" u="sng" dirty="0" err="1"/>
               <a:t>key</a:t>
             </a:r>
             <a:r>
-              <a:rPr dirty="0" err="1" smtClean="0"/>
+              <a:rPr dirty="0" err="1"/>
               <a:t>必须可以被找回</a:t>
             </a:r>
             <a:r>
-              <a:rPr lang="en-US" dirty="0" smtClean="0"/>
+              <a:rPr lang="en-US" dirty="0"/>
               <a:t>)</a:t>
             </a:r>
             <a:endParaRPr dirty="0"/>
@@ -3386,7 +3395,7 @@
           </a:ln>
           <a:extLst>
             <a:ext uri="{C572A759-6A51-4108-AA02-DFA0A04FC94B}">
-              <ma14:wrappingTextBoxFlag xmlns="" xmlns:ma14="http://schemas.microsoft.com/office/mac/drawingml/2011/main" val="1"/>
+              <ma14:wrappingTextBoxFlag xmlns:ma14="http://schemas.microsoft.com/office/mac/drawingml/2011/main" xmlns="" val="1"/>
             </a:ext>
           </a:extLst>
         </p:spPr>
@@ -3544,7 +3553,7 @@
           </a:ln>
           <a:extLst>
             <a:ext uri="{C572A759-6A51-4108-AA02-DFA0A04FC94B}">
-              <ma14:wrappingTextBoxFlag xmlns="" xmlns:ma14="http://schemas.microsoft.com/office/mac/drawingml/2011/main" val="1"/>
+              <ma14:wrappingTextBoxFlag xmlns:ma14="http://schemas.microsoft.com/office/mac/drawingml/2011/main" xmlns="" val="1"/>
             </a:ext>
           </a:extLst>
         </p:spPr>
@@ -3705,7 +3714,7 @@
           </a:ln>
           <a:extLst>
             <a:ext uri="{C572A759-6A51-4108-AA02-DFA0A04FC94B}">
-              <ma14:wrappingTextBoxFlag xmlns="" xmlns:ma14="http://schemas.microsoft.com/office/mac/drawingml/2011/main" val="1"/>
+              <ma14:wrappingTextBoxFlag xmlns:ma14="http://schemas.microsoft.com/office/mac/drawingml/2011/main" xmlns="" val="1"/>
             </a:ext>
           </a:extLst>
         </p:spPr>
@@ -3745,6 +3754,188 @@
         </p:txBody>
       </p:sp>
     </p:spTree>
+  </p:cSld>
+  <p:clrMapOvr>
+    <a:masterClrMapping/>
+  </p:clrMapOvr>
+  <p:transition spd="med"/>
+</p:sld>
+</file>
+
+<file path=ppt/slides/slide13.xml><?xml version="1.0" encoding="utf-8"?>
+<p:sld xmlns:a="http://schemas.openxmlformats.org/drawingml/2006/main" xmlns:r="http://schemas.openxmlformats.org/officeDocument/2006/relationships" xmlns:p="http://schemas.openxmlformats.org/presentationml/2006/main">
+  <p:cSld>
+    <p:spTree>
+      <p:nvGrpSpPr>
+        <p:cNvPr id="1" name=""/>
+        <p:cNvGrpSpPr/>
+        <p:nvPr/>
+      </p:nvGrpSpPr>
+      <p:grpSpPr>
+        <a:xfrm>
+          <a:off x="0" y="0"/>
+          <a:ext cx="0" cy="0"/>
+          <a:chOff x="0" y="0"/>
+          <a:chExt cx="0" cy="0"/>
+        </a:xfrm>
+      </p:grpSpPr>
+      <p:sp>
+        <p:nvSpPr>
+          <p:cNvPr id="2" name="TextBox 1">
+            <a:extLst>
+              <a:ext uri="{FF2B5EF4-FFF2-40B4-BE49-F238E27FC236}">
+                <a16:creationId xmlns:a16="http://schemas.microsoft.com/office/drawing/2014/main" id="{463CEFD2-10F6-484F-A04A-B5348581879F}"/>
+              </a:ext>
+            </a:extLst>
+          </p:cNvPr>
+          <p:cNvSpPr txBox="1"/>
+          <p:nvPr/>
+        </p:nvSpPr>
+        <p:spPr>
+          <a:xfrm>
+            <a:off x="885776" y="412304"/>
+            <a:ext cx="4603825" cy="656590"/>
+          </a:xfrm>
+          <a:prstGeom prst="rect">
+            <a:avLst/>
+          </a:prstGeom>
+          <a:noFill/>
+          <a:ln w="12700" cap="flat">
+            <a:noFill/>
+            <a:miter lim="400000"/>
+          </a:ln>
+          <a:effectLst/>
+          <a:sp3d/>
+        </p:spPr>
+        <p:style>
+          <a:lnRef idx="0">
+            <a:scrgbClr r="0" g="0" b="0"/>
+          </a:lnRef>
+          <a:fillRef idx="0">
+            <a:scrgbClr r="0" g="0" b="0"/>
+          </a:fillRef>
+          <a:effectRef idx="0">
+            <a:scrgbClr r="0" g="0" b="0"/>
+          </a:effectRef>
+          <a:fontRef idx="none"/>
+        </p:style>
+        <p:txBody>
+          <a:bodyPr rot="0" spcFirstLastPara="1" vertOverflow="overflow" horzOverflow="overflow" vert="horz" wrap="none" lIns="50800" tIns="50800" rIns="50800" bIns="50800" numCol="1" spcCol="38100" rtlCol="0" anchor="ctr">
+            <a:spAutoFit/>
+          </a:bodyPr>
+          <a:lstStyle/>
+          <a:p>
+            <a:pPr marL="0" marR="0" indent="0" algn="ctr" defTabSz="584200" rtl="0" fontAlgn="auto" latinLnBrk="0" hangingPunct="0">
+              <a:lnSpc>
+                <a:spcPct val="100000"/>
+              </a:lnSpc>
+              <a:spcBef>
+                <a:spcPts val="0"/>
+              </a:spcBef>
+              <a:spcAft>
+                <a:spcPts val="0"/>
+              </a:spcAft>
+              <a:buClrTx/>
+              <a:buSzTx/>
+              <a:buFontTx/>
+              <a:buNone/>
+              <a:tabLst/>
+            </a:pPr>
+            <a:r>
+              <a:rPr kumimoji="0" lang="en-US" altLang="zh-CN" sz="3600" b="0" i="0" u="none" strike="noStrike" cap="none" spc="0" normalizeH="0" baseline="0" dirty="0" err="1">
+                <a:ln>
+                  <a:noFill/>
+                </a:ln>
+                <a:solidFill>
+                  <a:srgbClr val="FFFFFF"/>
+                </a:solidFill>
+                <a:effectLst/>
+                <a:uFillTx/>
+                <a:latin typeface="+mn-lt"/>
+                <a:ea typeface="+mn-ea"/>
+                <a:cs typeface="+mn-cs"/>
+                <a:sym typeface="Helvetica Light"/>
+              </a:rPr>
+              <a:t>ToDo</a:t>
+            </a:r>
+            <a:r>
+              <a:rPr kumimoji="0" lang="en-US" altLang="zh-CN" sz="3600" b="0" i="0" u="none" strike="noStrike" cap="none" spc="0" normalizeH="0" baseline="0" dirty="0">
+                <a:ln>
+                  <a:noFill/>
+                </a:ln>
+                <a:solidFill>
+                  <a:srgbClr val="FFFFFF"/>
+                </a:solidFill>
+                <a:effectLst/>
+                <a:uFillTx/>
+                <a:latin typeface="+mn-lt"/>
+                <a:ea typeface="+mn-ea"/>
+                <a:cs typeface="+mn-cs"/>
+                <a:sym typeface="Helvetica Light"/>
+              </a:rPr>
+              <a:t>: </a:t>
+            </a:r>
+            <a:r>
+              <a:rPr kumimoji="0" lang="en-US" altLang="zh-CN" sz="3600" b="0" i="0" u="none" strike="noStrike" cap="none" spc="0" normalizeH="0" baseline="0" dirty="0" err="1">
+                <a:ln>
+                  <a:noFill/>
+                </a:ln>
+                <a:solidFill>
+                  <a:srgbClr val="FFFFFF"/>
+                </a:solidFill>
+                <a:effectLst/>
+                <a:uFillTx/>
+                <a:latin typeface="+mn-lt"/>
+                <a:ea typeface="+mn-ea"/>
+                <a:cs typeface="+mn-cs"/>
+                <a:sym typeface="Helvetica Light"/>
+              </a:rPr>
+              <a:t>aircrack</a:t>
+            </a:r>
+            <a:r>
+              <a:rPr kumimoji="0" lang="en-US" altLang="zh-CN" sz="3600" b="0" i="0" u="none" strike="noStrike" cap="none" spc="0" normalizeH="0" baseline="0" dirty="0">
+                <a:ln>
+                  <a:noFill/>
+                </a:ln>
+                <a:solidFill>
+                  <a:srgbClr val="FFFFFF"/>
+                </a:solidFill>
+                <a:effectLst/>
+                <a:uFillTx/>
+                <a:latin typeface="+mn-lt"/>
+                <a:ea typeface="+mn-ea"/>
+                <a:cs typeface="+mn-cs"/>
+                <a:sym typeface="Helvetica Light"/>
+              </a:rPr>
+              <a:t>-ng</a:t>
+            </a:r>
+            <a:r>
+              <a:rPr lang="zh-CN" altLang="en-US" dirty="0"/>
+              <a:t>用法</a:t>
+            </a:r>
+            <a:endParaRPr kumimoji="0" lang="en-US" sz="3600" b="0" i="0" u="none" strike="noStrike" cap="none" spc="0" normalizeH="0" baseline="0" dirty="0">
+              <a:ln>
+                <a:noFill/>
+              </a:ln>
+              <a:solidFill>
+                <a:srgbClr val="FFFFFF"/>
+              </a:solidFill>
+              <a:effectLst/>
+              <a:uFillTx/>
+              <a:latin typeface="+mn-lt"/>
+              <a:ea typeface="+mn-ea"/>
+              <a:cs typeface="+mn-cs"/>
+              <a:sym typeface="Helvetica Light"/>
+            </a:endParaRPr>
+          </a:p>
+        </p:txBody>
+      </p:sp>
+    </p:spTree>
+    <p:extLst>
+      <p:ext uri="{BB962C8B-B14F-4D97-AF65-F5344CB8AC3E}">
+        <p14:creationId xmlns:p14="http://schemas.microsoft.com/office/powerpoint/2010/main" val="2282393226"/>
+      </p:ext>
+    </p:extLst>
   </p:cSld>
   <p:clrMapOvr>
     <a:masterClrMapping/>
@@ -3789,7 +3980,7 @@
           </a:ln>
           <a:extLst>
             <a:ext uri="{C572A759-6A51-4108-AA02-DFA0A04FC94B}">
-              <ma14:wrappingTextBoxFlag xmlns="" xmlns:ma14="http://schemas.microsoft.com/office/mac/drawingml/2011/main" val="1"/>
+              <ma14:wrappingTextBoxFlag xmlns:ma14="http://schemas.microsoft.com/office/mac/drawingml/2011/main" xmlns="" val="1"/>
             </a:ext>
           </a:extLst>
         </p:spPr>
@@ -3875,63 +4066,51 @@
               <a:buChar char="•"/>
             </a:pPr>
             <a:r>
-              <a:rPr dirty="0" smtClean="0"/>
+              <a:rPr dirty="0"/>
               <a:t>Hardening</a:t>
             </a:r>
             <a:r>
-              <a:rPr lang="en-US" dirty="0" smtClean="0"/>
+              <a:rPr lang="en-US" dirty="0"/>
               <a:t> </a:t>
             </a:r>
             <a:r>
-              <a:rPr lang="zh-CN" altLang="en-US" dirty="0" smtClean="0"/>
+              <a:rPr lang="zh-CN" altLang="en-US" dirty="0"/>
               <a:t>（</a:t>
             </a:r>
             <a:r>
-              <a:rPr lang="en-US" altLang="zh-CN" dirty="0" err="1" smtClean="0"/>
+              <a:rPr lang="en-US" altLang="zh-CN" dirty="0" err="1"/>
               <a:t>a.k.a</a:t>
             </a:r>
             <a:r>
-              <a:rPr lang="en-US" altLang="zh-CN" smtClean="0"/>
+              <a:rPr lang="en-US" altLang="zh-CN"/>
               <a:t> a </a:t>
             </a:r>
             <a:r>
-              <a:rPr lang="en-US" altLang="ja-JP" smtClean="0"/>
+              <a:rPr lang="en-US" altLang="ja-JP"/>
               <a:t>process </a:t>
             </a:r>
             <a:r>
               <a:rPr lang="en-US" altLang="ja-JP" dirty="0"/>
-              <a:t>of making an operating system secure from </a:t>
-            </a:r>
-            <a:r>
-              <a:rPr lang="en-US" altLang="ja-JP" dirty="0" smtClean="0"/>
-              <a:t>attack</a:t>
-            </a:r>
-            <a:r>
-              <a:rPr lang="zh-CN" altLang="en-US" dirty="0" smtClean="0"/>
+              <a:t>of making an operating system secure from attack</a:t>
+            </a:r>
+            <a:r>
+              <a:rPr lang="zh-CN" altLang="en-US" dirty="0"/>
               <a:t>）</a:t>
             </a:r>
             <a:r>
-              <a:rPr dirty="0" smtClean="0"/>
+              <a:rPr dirty="0"/>
+              <a:t> = remove nonessential services</a:t>
+            </a:r>
+            <a:r>
+              <a:rPr lang="en-US" dirty="0"/>
               <a:t> </a:t>
             </a:r>
             <a:r>
-              <a:rPr dirty="0"/>
-              <a:t>= remove nonessential </a:t>
-            </a:r>
-            <a:r>
-              <a:rPr dirty="0" smtClean="0"/>
-              <a:t>services</a:t>
-            </a:r>
-            <a:r>
-              <a:rPr lang="en-US" dirty="0" smtClean="0"/>
-              <a:t> </a:t>
-            </a:r>
-            <a:r>
-              <a:rPr lang="zh-CN" altLang="en-US" dirty="0" smtClean="0"/>
+              <a:rPr lang="zh-CN" altLang="en-US" dirty="0"/>
               <a:t>或者 </a:t>
             </a:r>
             <a:r>
-              <a:rPr lang="en-US" altLang="zh-CN" dirty="0" smtClean="0"/>
+              <a:rPr lang="en-US" altLang="zh-CN" dirty="0"/>
               <a:t>remove unneeded protocols</a:t>
             </a:r>
             <a:endParaRPr dirty="0"/>
@@ -4051,7 +4230,7 @@
           </a:ln>
           <a:extLst>
             <a:ext uri="{C572A759-6A51-4108-AA02-DFA0A04FC94B}">
-              <ma14:wrappingTextBoxFlag xmlns="" xmlns:ma14="http://schemas.microsoft.com/office/mac/drawingml/2011/main" val="1"/>
+              <ma14:wrappingTextBoxFlag xmlns:ma14="http://schemas.microsoft.com/office/mac/drawingml/2011/main" xmlns="" val="1"/>
             </a:ext>
           </a:extLst>
         </p:spPr>
@@ -4125,13 +4304,9 @@
             </a:pPr>
             <a:r>
               <a:rPr dirty="0"/>
-              <a:t>ARP = address resolution protocol, to get MAC </a:t>
-            </a:r>
-            <a:r>
-              <a:rPr dirty="0" smtClean="0"/>
-              <a:t>address</a:t>
-            </a:r>
-            <a:endParaRPr lang="en-US" dirty="0" smtClean="0"/>
+              <a:t>ARP = address resolution protocol, to get MAC address</a:t>
+            </a:r>
+            <a:endParaRPr lang="en-US" dirty="0"/>
           </a:p>
           <a:p>
             <a:pPr marL="421105" indent="-421105" algn="l">
@@ -4139,7 +4314,7 @@
               <a:buChar char="•"/>
             </a:pPr>
             <a:r>
-              <a:rPr lang="en-US" dirty="0" smtClean="0"/>
+              <a:rPr lang="en-US" dirty="0"/>
               <a:t>NAT = Network Address Translation</a:t>
             </a:r>
             <a:endParaRPr dirty="0"/>
@@ -4249,7 +4424,7 @@
           </a:ln>
           <a:extLst>
             <a:ext uri="{C572A759-6A51-4108-AA02-DFA0A04FC94B}">
-              <ma14:wrappingTextBoxFlag xmlns="" xmlns:ma14="http://schemas.microsoft.com/office/mac/drawingml/2011/main" val="1"/>
+              <ma14:wrappingTextBoxFlag xmlns:ma14="http://schemas.microsoft.com/office/mac/drawingml/2011/main" xmlns="" val="1"/>
             </a:ext>
           </a:extLst>
         </p:spPr>
@@ -4277,7 +4452,7 @@
               <a:rPr dirty="0"/>
               <a:t>To sum it up in simple terms, </a:t>
             </a:r>
-            <a:endParaRPr lang="en-US" dirty="0" smtClean="0"/>
+            <a:endParaRPr lang="en-US" dirty="0"/>
           </a:p>
           <a:p>
             <a:pPr algn="l" defTabSz="457200">
@@ -4295,7 +4470,7 @@
               </a:defRPr>
             </a:pPr>
             <a:r>
-              <a:rPr dirty="0" smtClean="0">
+              <a:rPr dirty="0">
                 <a:solidFill>
                   <a:srgbClr val="FF0D00"/>
                 </a:solidFill>
@@ -4303,14 +4478,10 @@
               <a:t>Telnet</a:t>
             </a:r>
             <a:r>
-              <a:rPr dirty="0" smtClean="0"/>
-              <a:t> </a:t>
-            </a:r>
-            <a:r>
               <a:rPr dirty="0"/>
-              <a:t>is used to communicate with other computers and machines in a text-based manner. </a:t>
-            </a:r>
-            <a:endParaRPr lang="en-US" dirty="0" smtClean="0"/>
+              <a:t> is used to communicate with other computers and machines in a text-based manner. </a:t>
+            </a:r>
+            <a:endParaRPr lang="en-US" dirty="0"/>
           </a:p>
           <a:p>
             <a:pPr algn="l" defTabSz="457200">
@@ -4328,12 +4499,8 @@
               </a:defRPr>
             </a:pPr>
             <a:r>
-              <a:rPr dirty="0" smtClean="0"/>
-              <a:t>A </a:t>
-            </a:r>
-            <a:r>
               <a:rPr dirty="0"/>
-              <a:t>telnet session looks something like this:</a:t>
+              <a:t>A telnet session looks something like this:</a:t>
             </a:r>
           </a:p>
           <a:p>
@@ -4400,7 +4567,7 @@
           </a:ln>
           <a:extLst>
             <a:ext uri="{C572A759-6A51-4108-AA02-DFA0A04FC94B}">
-              <ma14:wrappingTextBoxFlag xmlns="" xmlns:ma14="http://schemas.microsoft.com/office/mac/drawingml/2011/main" val="1"/>
+              <ma14:wrappingTextBoxFlag xmlns:ma14="http://schemas.microsoft.com/office/mac/drawingml/2011/main" xmlns="" val="1"/>
             </a:ext>
           </a:extLst>
         </p:spPr>
@@ -4675,7 +4842,7 @@
           </a:ln>
           <a:extLst>
             <a:ext uri="{C572A759-6A51-4108-AA02-DFA0A04FC94B}">
-              <ma14:wrappingTextBoxFlag xmlns="" xmlns:ma14="http://schemas.microsoft.com/office/mac/drawingml/2011/main" val="1"/>
+              <ma14:wrappingTextBoxFlag xmlns:ma14="http://schemas.microsoft.com/office/mac/drawingml/2011/main" xmlns="" val="1"/>
             </a:ext>
           </a:extLst>
         </p:spPr>
@@ -4741,13 +4908,9 @@
             </a:pPr>
             <a:r>
               <a:rPr dirty="0"/>
-              <a:t>HTTP = </a:t>
-            </a:r>
-            <a:r>
-              <a:rPr dirty="0" smtClean="0"/>
-              <a:t>80</a:t>
-            </a:r>
-            <a:endParaRPr lang="en-US" dirty="0" smtClean="0"/>
+              <a:t>HTTP = 80</a:t>
+            </a:r>
+            <a:endParaRPr lang="en-US" dirty="0"/>
           </a:p>
           <a:p>
             <a:pPr marL="865605" lvl="1" indent="-421105" algn="l">
@@ -4755,7 +4918,7 @@
               <a:buChar char="•"/>
             </a:pPr>
             <a:r>
-              <a:rPr lang="en-US" dirty="0" smtClean="0"/>
+              <a:rPr lang="en-US" dirty="0"/>
               <a:t>HTTPS = 443</a:t>
             </a:r>
             <a:endParaRPr dirty="0"/>
@@ -4875,7 +5038,7 @@
           </a:ln>
           <a:extLst>
             <a:ext uri="{C572A759-6A51-4108-AA02-DFA0A04FC94B}">
-              <ma14:wrappingTextBoxFlag xmlns="" xmlns:ma14="http://schemas.microsoft.com/office/mac/drawingml/2011/main" val="1"/>
+              <ma14:wrappingTextBoxFlag xmlns:ma14="http://schemas.microsoft.com/office/mac/drawingml/2011/main" xmlns="" val="1"/>
             </a:ext>
           </a:extLst>
         </p:spPr>
@@ -5003,7 +5166,7 @@
           </a:ln>
           <a:extLst>
             <a:ext uri="{C572A759-6A51-4108-AA02-DFA0A04FC94B}">
-              <ma14:wrappingTextBoxFlag xmlns="" xmlns:ma14="http://schemas.microsoft.com/office/mac/drawingml/2011/main" val="1"/>
+              <ma14:wrappingTextBoxFlag xmlns:ma14="http://schemas.microsoft.com/office/mac/drawingml/2011/main" xmlns="" val="1"/>
             </a:ext>
           </a:extLst>
         </p:spPr>
@@ -5191,7 +5354,7 @@
           </a:ln>
           <a:extLst>
             <a:ext uri="{C572A759-6A51-4108-AA02-DFA0A04FC94B}">
-              <ma14:wrappingTextBoxFlag xmlns="" xmlns:ma14="http://schemas.microsoft.com/office/mac/drawingml/2011/main" val="1"/>
+              <ma14:wrappingTextBoxFlag xmlns:ma14="http://schemas.microsoft.com/office/mac/drawingml/2011/main" xmlns="" val="1"/>
             </a:ext>
           </a:extLst>
         </p:spPr>
@@ -5362,7 +5525,7 @@
           </a:ln>
           <a:extLst>
             <a:ext uri="{C572A759-6A51-4108-AA02-DFA0A04FC94B}">
-              <ma14:wrappingTextBoxFlag xmlns="" xmlns:ma14="http://schemas.microsoft.com/office/mac/drawingml/2011/main" val="1"/>
+              <ma14:wrappingTextBoxFlag xmlns:ma14="http://schemas.microsoft.com/office/mac/drawingml/2011/main" xmlns="" val="1"/>
             </a:ext>
           </a:extLst>
         </p:spPr>

</xml_diff>